<commit_message>
Updates on slides and script
</commit_message>
<xml_diff>
--- a/06.Presentation/A3videoA42pptx_LM_KT.pptx
+++ b/06.Presentation/A3videoA42pptx_LM_KT.pptx
@@ -3403,7 +3403,7 @@
               </a:spcAft>
             </a:pPr>
             <a:r>
-              <a:rPr lang="en-US" sz="1800" kern="100" dirty="0">
+              <a:rPr lang="en-ZA" sz="1800" kern="100" dirty="0">
                 <a:effectLst/>
                 <a:latin typeface="Calibri" panose="020F0502020204030204" pitchFamily="34" charset="0"/>
                 <a:ea typeface="Calibri" panose="020F0502020204030204" pitchFamily="34" charset="0"/>
@@ -3422,13 +3422,13 @@
               </a:spcAft>
             </a:pPr>
             <a:r>
-              <a:rPr lang="en-US" sz="1800" kern="100" dirty="0">
+              <a:rPr lang="en-ZA" sz="1800" kern="100" dirty="0">
                 <a:effectLst/>
                 <a:latin typeface="Calibri" panose="020F0502020204030204" pitchFamily="34" charset="0"/>
                 <a:ea typeface="Calibri" panose="020F0502020204030204" pitchFamily="34" charset="0"/>
                 <a:cs typeface="Times New Roman" panose="02020603050405020304" pitchFamily="18" charset="0"/>
               </a:rPr>
-              <a:t>The first step was importing a clean and complete dataset that was used in the research paper we are comparing our results to. The dataset was then split into a 70:30 ratio of training to testing subsets.</a:t>
+              <a:t>The first step was importing a clean and complete dataset that was used in the research paper we are comparing our results to. It is worth noting that during the initial data exploration, we did observe a skewed class distribution in the target feature. Following the data importation and exploration the dataset was then split into a 70:30 ratio of training to testing subsets.</a:t>
             </a:r>
           </a:p>
           <a:p>
@@ -3441,7 +3441,7 @@
               </a:spcAft>
             </a:pPr>
             <a:r>
-              <a:rPr lang="en-US" sz="1800" kern="100" dirty="0">
+              <a:rPr lang="en-ZA" sz="1800" kern="100" dirty="0">
                 <a:effectLst/>
                 <a:latin typeface="Calibri" panose="020F0502020204030204" pitchFamily="34" charset="0"/>
                 <a:ea typeface="Calibri" panose="020F0502020204030204" pitchFamily="34" charset="0"/>
@@ -3460,7 +3460,7 @@
               </a:spcAft>
             </a:pPr>
             <a:r>
-              <a:rPr lang="en-US" sz="1800" kern="100" dirty="0">
+              <a:rPr lang="en-ZA" sz="1800" kern="100" dirty="0">
                 <a:effectLst/>
                 <a:latin typeface="Calibri" panose="020F0502020204030204" pitchFamily="34" charset="0"/>
                 <a:ea typeface="Calibri" panose="020F0502020204030204" pitchFamily="34" charset="0"/>
@@ -3469,7 +3469,7 @@
               <a:t>The following step involved imputing the missing values that were introduced in the previous step. Two methods were applied namely mode imputation and Naïve Bayes imputation. Because our data consisted of only categorical features, the mode of each feature was determined and used to fill in the missing values. For the Naïve Bayes imputation, I built and trained the Naïve Bayes model for each feature, and assigned the predicted values from the model to the missing values. From the imputation methods, two separate data frames were created; the </a:t>
             </a:r>
             <a:r>
-              <a:rPr lang="en-US" sz="1800" kern="100" dirty="0" err="1">
+              <a:rPr lang="en-ZA" sz="1800" kern="100" dirty="0" err="1">
                 <a:effectLst/>
                 <a:latin typeface="Calibri" panose="020F0502020204030204" pitchFamily="34" charset="0"/>
                 <a:ea typeface="Calibri" panose="020F0502020204030204" pitchFamily="34" charset="0"/>
@@ -3478,7 +3478,7 @@
               <a:t>mode_imputation</a:t>
             </a:r>
             <a:r>
-              <a:rPr lang="en-US" sz="1800" kern="100" dirty="0">
+              <a:rPr lang="en-ZA" sz="1800" kern="100" dirty="0">
                 <a:effectLst/>
                 <a:latin typeface="Calibri" panose="020F0502020204030204" pitchFamily="34" charset="0"/>
                 <a:ea typeface="Calibri" panose="020F0502020204030204" pitchFamily="34" charset="0"/>
@@ -3487,7 +3487,7 @@
               <a:t> and </a:t>
             </a:r>
             <a:r>
-              <a:rPr lang="en-US" sz="1800" kern="100" dirty="0" err="1">
+              <a:rPr lang="en-ZA" sz="1800" kern="100" dirty="0" err="1">
                 <a:effectLst/>
                 <a:latin typeface="Calibri" panose="020F0502020204030204" pitchFamily="34" charset="0"/>
                 <a:ea typeface="Calibri" panose="020F0502020204030204" pitchFamily="34" charset="0"/>
@@ -3496,7 +3496,7 @@
               <a:t>nb_imputation</a:t>
             </a:r>
             <a:r>
-              <a:rPr lang="en-US" sz="1800" kern="100" dirty="0">
+              <a:rPr lang="en-ZA" sz="1800" kern="100" dirty="0">
                 <a:effectLst/>
                 <a:latin typeface="Calibri" panose="020F0502020204030204" pitchFamily="34" charset="0"/>
                 <a:ea typeface="Calibri" panose="020F0502020204030204" pitchFamily="34" charset="0"/>
@@ -3515,13 +3515,13 @@
               </a:spcAft>
             </a:pPr>
             <a:r>
-              <a:rPr lang="en-US" sz="1800" kern="100" dirty="0">
+              <a:rPr lang="en-ZA" sz="1800" kern="100" dirty="0">
                 <a:effectLst/>
                 <a:latin typeface="Calibri" panose="020F0502020204030204" pitchFamily="34" charset="0"/>
                 <a:ea typeface="Calibri" panose="020F0502020204030204" pitchFamily="34" charset="0"/>
                 <a:cs typeface="Times New Roman" panose="02020603050405020304" pitchFamily="18" charset="0"/>
               </a:rPr>
-              <a:t>The final step was to map the numerical values assigned by the Naïve Bayes model back to the original classes for each feature and calculating the NA counts for all the data frames created to ensure that missing values were all imputed.</a:t>
+              <a:t>The final step was to map the numerical values assigned to the categorical variables by the Naïve Bayes model back to the original classes for each feature and calculating the NA counts for all the data frames created to ensure that missing values were all imputed.</a:t>
             </a:r>
           </a:p>
           <a:p>
@@ -3534,30 +3534,23 @@
               </a:spcAft>
             </a:pPr>
             <a:r>
-              <a:rPr lang="en-US" sz="1800" kern="100" dirty="0">
+              <a:rPr lang="en-ZA" sz="1800" kern="100" dirty="0">
                 <a:effectLst/>
                 <a:latin typeface="Calibri" panose="020F0502020204030204" pitchFamily="34" charset="0"/>
                 <a:ea typeface="Calibri" panose="020F0502020204030204" pitchFamily="34" charset="0"/>
                 <a:cs typeface="Times New Roman" panose="02020603050405020304" pitchFamily="18" charset="0"/>
               </a:rPr>
-              <a:t>At the end of this process, we were left with 8 datasets. A testing set consisting of 30% of the original dataset with no missing values, a training set consisting of 70% of the original dataset with no missing values, 3 training sets imputed with the mode for 10, 40 and 70% missing values that were introduced, and 3 training sets imputed via the Naïve Bayes model for the 10, 40 and 70% missing values that were introduced.</a:t>
-            </a:r>
-          </a:p>
-          <a:p>
-            <a:pPr>
-              <a:lnSpc>
-                <a:spcPct val="107000"/>
-              </a:lnSpc>
-              <a:spcAft>
-                <a:spcPts val="800"/>
-              </a:spcAft>
-            </a:pPr>
-            <a:endParaRPr lang="en-ZA" sz="1800" kern="100" dirty="0">
-              <a:effectLst/>
-              <a:latin typeface="Calibri" panose="020F0502020204030204" pitchFamily="34" charset="0"/>
-              <a:ea typeface="Calibri" panose="020F0502020204030204" pitchFamily="34" charset="0"/>
-              <a:cs typeface="Times New Roman" panose="02020603050405020304" pitchFamily="18" charset="0"/>
-            </a:endParaRPr>
+              <a:t>At the end of this process, we were left with 8 datasets. </a:t>
+            </a:r>
+            <a:r>
+              <a:rPr lang="en-ZA" sz="1800" kern="100">
+                <a:effectLst/>
+                <a:latin typeface="Calibri" panose="020F0502020204030204" pitchFamily="34" charset="0"/>
+                <a:ea typeface="Calibri" panose="020F0502020204030204" pitchFamily="34" charset="0"/>
+                <a:cs typeface="Times New Roman" panose="02020603050405020304" pitchFamily="18" charset="0"/>
+              </a:rPr>
+              <a:t>A testing set consisting of 30% of the original dataset with no missing values, a training set consisting of 70% of the original dataset with no missing values, 3 training sets imputed with the mode for 10, 40 and 70% missing values that were introduced, and 3 training sets imputed via the Naïve Bayes model for the 10, 40 and 70% missing values that were introduced.</a:t>
+            </a:r>
           </a:p>
         </p:txBody>
       </p:sp>
@@ -13526,7 +13519,7 @@
           </a:ln>
           <a:extLst>
             <a:ext uri="{C572A759-6A51-4108-AA02-DFA0A04FC94B}">
-              <ma14:wrappingTextBoxFlag xmlns="" xmlns:m="http://schemas.openxmlformats.org/officeDocument/2006/math" xmlns:a14="http://schemas.microsoft.com/office/drawing/2010/main" xmlns:ma14="http://schemas.microsoft.com/office/mac/drawingml/2011/main" val="1"/>
+              <ma14:wrappingTextBoxFlag xmlns:ma14="http://schemas.microsoft.com/office/mac/drawingml/2011/main" xmlns:a14="http://schemas.microsoft.com/office/drawing/2010/main" xmlns:m="http://schemas.openxmlformats.org/officeDocument/2006/math" xmlns="" val="1"/>
             </a:ext>
           </a:extLst>
         </p:spPr>
@@ -13938,7 +13931,7 @@
           </a:ln>
           <a:extLst>
             <a:ext uri="{C572A759-6A51-4108-AA02-DFA0A04FC94B}">
-              <ma14:wrappingTextBoxFlag xmlns="" xmlns:m="http://schemas.openxmlformats.org/officeDocument/2006/math" xmlns:a14="http://schemas.microsoft.com/office/drawing/2010/main" xmlns:ma14="http://schemas.microsoft.com/office/mac/drawingml/2011/main" val="1"/>
+              <ma14:wrappingTextBoxFlag xmlns:ma14="http://schemas.microsoft.com/office/mac/drawingml/2011/main" xmlns:a14="http://schemas.microsoft.com/office/drawing/2010/main" xmlns:m="http://schemas.openxmlformats.org/officeDocument/2006/math" xmlns="" val="1"/>
             </a:ext>
           </a:extLst>
         </p:spPr>
@@ -14385,7 +14378,7 @@
           </a:ln>
           <a:extLst>
             <a:ext uri="{C572A759-6A51-4108-AA02-DFA0A04FC94B}">
-              <ma14:wrappingTextBoxFlag xmlns="" xmlns:m="http://schemas.openxmlformats.org/officeDocument/2006/math" xmlns:a14="http://schemas.microsoft.com/office/drawing/2010/main" xmlns:ma14="http://schemas.microsoft.com/office/mac/drawingml/2011/main" val="1"/>
+              <ma14:wrappingTextBoxFlag xmlns:ma14="http://schemas.microsoft.com/office/mac/drawingml/2011/main" xmlns:a14="http://schemas.microsoft.com/office/drawing/2010/main" xmlns:m="http://schemas.openxmlformats.org/officeDocument/2006/math" xmlns="" val="1"/>
             </a:ext>
           </a:extLst>
         </p:spPr>
@@ -14595,7 +14588,7 @@
           </a:ln>
           <a:extLst>
             <a:ext uri="{C572A759-6A51-4108-AA02-DFA0A04FC94B}">
-              <ma14:wrappingTextBoxFlag xmlns="" xmlns:m="http://schemas.openxmlformats.org/officeDocument/2006/math" xmlns:a14="http://schemas.microsoft.com/office/drawing/2010/main" xmlns:ma14="http://schemas.microsoft.com/office/mac/drawingml/2011/main" val="1"/>
+              <ma14:wrappingTextBoxFlag xmlns:ma14="http://schemas.microsoft.com/office/mac/drawingml/2011/main" xmlns:a14="http://schemas.microsoft.com/office/drawing/2010/main" xmlns:m="http://schemas.openxmlformats.org/officeDocument/2006/math" xmlns="" val="1"/>
             </a:ext>
           </a:extLst>
         </p:spPr>
@@ -27729,7 +27722,7 @@
         <p:spPr>
           <a:xfrm>
             <a:off x="1012556" y="1266025"/>
-            <a:ext cx="10166888" cy="5078313"/>
+            <a:ext cx="10166888" cy="5355312"/>
           </a:xfrm>
           <a:prstGeom prst="rect">
             <a:avLst/>
@@ -27837,17 +27830,19 @@
               <a:t>At the end of the process described above there were eight datasets </a:t>
             </a:r>
             <a:r>
-              <a:rPr lang="en-ZA"/>
-              <a:t>creat.</a:t>
-            </a:r>
-            <a:endParaRPr lang="en-ZA" dirty="0"/>
-          </a:p>
-          <a:p>
-            <a:pPr marL="342900" indent="-342900">
-              <a:buFont typeface="+mj-lt"/>
-              <a:buAutoNum type="arabicPeriod"/>
-            </a:pPr>
-            <a:endParaRPr lang="en-ZA" dirty="0"/>
+              <a:rPr lang="en-ZA" dirty="0" err="1"/>
+              <a:t>creat</a:t>
+            </a:r>
+            <a:r>
+              <a:rPr lang="en-ZA" dirty="0"/>
+              <a:t>.</a:t>
+            </a:r>
+          </a:p>
+          <a:p>
+            <a:r>
+              <a:rPr lang="en-ZA" dirty="0"/>
+              <a:t>Important note: initial data exploration did show skewed class distribution of the target feature.</a:t>
+            </a:r>
           </a:p>
         </p:txBody>
       </p:sp>
@@ -30412,41 +30407,41 @@
 </file>
 
 <file path=customXml/item1.xml><?xml version="1.0" encoding="utf-8"?>
+<TemplafySlideTemplateConfiguration><![CDATA[{"slideVersion":1,"isValidatorEnabled":false,"isLocked":false,"elementsMetadata":[],"slideId":"638048769900279182","enableDocumentContentUpdater":false,"version":"2.0"}]]></TemplafySlideTemplateConfiguration>
+</file>
+
+<file path=customXml/item2.xml><?xml version="1.0" encoding="utf-8"?>
+<TemplafyTemplateConfiguration><![CDATA[{"elementsMetadata":[],"transformationConfigurations":[],"templateName":"Template 2024","templateDescription":"","enableDocumentContentUpdater":false,"version":"2.0"}]]></TemplafyTemplateConfiguration>
+</file>
+
+<file path=customXml/item3.xml><?xml version="1.0" encoding="utf-8"?>
+<TemplafyFormConfiguration><![CDATA[{"formFields":[],"formDataEntries":[]}]]></TemplafyFormConfiguration>
+</file>
+
+<file path=customXml/item4.xml><?xml version="1.0" encoding="utf-8"?>
 <TemplafySlideFormConfiguration><![CDATA[{"formFields":[],"formDataEntries":[]}]]></TemplafySlideFormConfiguration>
 </file>
 
-<file path=customXml/item2.xml><?xml version="1.0" encoding="utf-8"?>
-<TemplafyFormConfiguration><![CDATA[{"formFields":[],"formDataEntries":[]}]]></TemplafyFormConfiguration>
-</file>
-
-<file path=customXml/item3.xml><?xml version="1.0" encoding="utf-8"?>
-<TemplafyTemplateConfiguration><![CDATA[{"elementsMetadata":[],"transformationConfigurations":[],"templateName":"Template 2024","templateDescription":"","enableDocumentContentUpdater":false,"version":"2.0"}]]></TemplafyTemplateConfiguration>
-</file>
-
-<file path=customXml/item4.xml><?xml version="1.0" encoding="utf-8"?>
-<TemplafySlideTemplateConfiguration><![CDATA[{"slideVersion":1,"isValidatorEnabled":false,"isLocked":false,"elementsMetadata":[],"slideId":"638048769900279182","enableDocumentContentUpdater":false,"version":"2.0"}]]></TemplafySlideTemplateConfiguration>
-</file>
-
 <file path=customXml/itemProps1.xml><?xml version="1.0" encoding="utf-8"?>
-<ds:datastoreItem xmlns:ds="http://schemas.openxmlformats.org/officeDocument/2006/customXml" ds:itemID="{318FE172-2E4A-41F3-98F3-1CD8CCD9375A}">
+<ds:datastoreItem xmlns:ds="http://schemas.openxmlformats.org/officeDocument/2006/customXml" ds:itemID="{31A6E273-308C-4E61-93A6-3725B57DDBD2}">
   <ds:schemaRefs/>
 </ds:datastoreItem>
 </file>
 
 <file path=customXml/itemProps2.xml><?xml version="1.0" encoding="utf-8"?>
+<ds:datastoreItem xmlns:ds="http://schemas.openxmlformats.org/officeDocument/2006/customXml" ds:itemID="{43877E11-121F-45E2-A0FE-16DFA988BBD5}">
+  <ds:schemaRefs/>
+</ds:datastoreItem>
+</file>
+
+<file path=customXml/itemProps3.xml><?xml version="1.0" encoding="utf-8"?>
 <ds:datastoreItem xmlns:ds="http://schemas.openxmlformats.org/officeDocument/2006/customXml" ds:itemID="{9A03A13C-D5E3-49F8-B37D-AFA024345652}">
   <ds:schemaRefs/>
 </ds:datastoreItem>
 </file>
 
-<file path=customXml/itemProps3.xml><?xml version="1.0" encoding="utf-8"?>
-<ds:datastoreItem xmlns:ds="http://schemas.openxmlformats.org/officeDocument/2006/customXml" ds:itemID="{43877E11-121F-45E2-A0FE-16DFA988BBD5}">
-  <ds:schemaRefs/>
-</ds:datastoreItem>
-</file>
-
 <file path=customXml/itemProps4.xml><?xml version="1.0" encoding="utf-8"?>
-<ds:datastoreItem xmlns:ds="http://schemas.openxmlformats.org/officeDocument/2006/customXml" ds:itemID="{31A6E273-308C-4E61-93A6-3725B57DDBD2}">
+<ds:datastoreItem xmlns:ds="http://schemas.openxmlformats.org/officeDocument/2006/customXml" ds:itemID="{318FE172-2E4A-41F3-98F3-1CD8CCD9375A}">
   <ds:schemaRefs/>
 </ds:datastoreItem>
 </file>
</xml_diff>